<commit_message>
Powerpoint for presentation of ETD
</commit_message>
<xml_diff>
--- a/etd.pptx
+++ b/etd.pptx
@@ -125,7 +125,7 @@
   </p:defaultTextStyle>
   <p:extLst>
     <p:ext uri="{EFAFB233-063F-42B5-8137-9DF3F51BA10A}">
-      <p15:sldGuideLst xmlns:p15="http://schemas.microsoft.com/office/powerpoint/2012/main" xmlns="">
+      <p15:sldGuideLst xmlns="" xmlns:p15="http://schemas.microsoft.com/office/powerpoint/2012/main">
         <p15:guide id="1" orient="horz" pos="1620">
           <p15:clr>
             <a:srgbClr val="A4A3A4"/>
@@ -225,7 +225,7 @@
             <a:fld id="{F9383C40-BEAD-4685-80AD-95924B239651}" type="datetimeFigureOut">
               <a:rPr lang="en-US" smtClean="0"/>
               <a:pPr/>
-              <a:t>9/2/2018</a:t>
+              <a:t>9/4/2018</a:t>
             </a:fld>
             <a:endParaRPr lang="en-US"/>
           </a:p>
@@ -394,7 +394,7 @@
     </p:spTree>
     <p:extLst>
       <p:ext uri="{BB962C8B-B14F-4D97-AF65-F5344CB8AC3E}">
-        <p14:creationId xmlns="" xmlns:p14="http://schemas.microsoft.com/office/powerpoint/2010/main" val="512084359"/>
+        <p14:creationId xmlns:p14="http://schemas.microsoft.com/office/powerpoint/2010/main" xmlns="" val="512084359"/>
       </p:ext>
     </p:extLst>
   </p:cSld>
@@ -722,7 +722,7 @@
             <a:fld id="{785147F8-B6EB-4957-B051-41B16A08FB15}" type="datetime1">
               <a:rPr lang="en-US" smtClean="0"/>
               <a:pPr/>
-              <a:t>9/2/2018</a:t>
+              <a:t>9/4/2018</a:t>
             </a:fld>
             <a:endParaRPr lang="en-US"/>
           </a:p>
@@ -774,7 +774,7 @@
     </p:spTree>
     <p:extLst>
       <p:ext uri="{BB962C8B-B14F-4D97-AF65-F5344CB8AC3E}">
-        <p14:creationId xmlns="" xmlns:p14="http://schemas.microsoft.com/office/powerpoint/2010/main" val="3253875174"/>
+        <p14:creationId xmlns:p14="http://schemas.microsoft.com/office/powerpoint/2010/main" xmlns="" val="3253875174"/>
       </p:ext>
     </p:extLst>
   </p:cSld>
@@ -977,7 +977,7 @@
             <a:fld id="{39995A0B-C171-4934-BEF1-07BF4CF08F3A}" type="datetime1">
               <a:rPr lang="en-US" smtClean="0"/>
               <a:pPr/>
-              <a:t>9/2/2018</a:t>
+              <a:t>9/4/2018</a:t>
             </a:fld>
             <a:endParaRPr lang="en-US"/>
           </a:p>
@@ -1029,7 +1029,7 @@
     </p:spTree>
     <p:extLst>
       <p:ext uri="{BB962C8B-B14F-4D97-AF65-F5344CB8AC3E}">
-        <p14:creationId xmlns="" xmlns:p14="http://schemas.microsoft.com/office/powerpoint/2010/main" val="477607843"/>
+        <p14:creationId xmlns:p14="http://schemas.microsoft.com/office/powerpoint/2010/main" xmlns="" val="477607843"/>
       </p:ext>
     </p:extLst>
   </p:cSld>
@@ -1149,7 +1149,7 @@
             <a:fld id="{A0CFB000-1CDA-47D4-B85A-51BF5BBB24D7}" type="datetime1">
               <a:rPr lang="en-US" smtClean="0"/>
               <a:pPr/>
-              <a:t>9/2/2018</a:t>
+              <a:t>9/4/2018</a:t>
             </a:fld>
             <a:endParaRPr lang="en-US"/>
           </a:p>
@@ -1201,7 +1201,7 @@
     </p:spTree>
     <p:extLst>
       <p:ext uri="{BB962C8B-B14F-4D97-AF65-F5344CB8AC3E}">
-        <p14:creationId xmlns="" xmlns:p14="http://schemas.microsoft.com/office/powerpoint/2010/main" val="3428665726"/>
+        <p14:creationId xmlns:p14="http://schemas.microsoft.com/office/powerpoint/2010/main" xmlns="" val="3428665726"/>
       </p:ext>
     </p:extLst>
   </p:cSld>
@@ -1331,7 +1331,7 @@
             <a:fld id="{FAEFA7A1-98A7-4DA2-BA42-43BBBC8C3A6A}" type="datetime1">
               <a:rPr lang="en-US" smtClean="0"/>
               <a:pPr/>
-              <a:t>9/2/2018</a:t>
+              <a:t>9/4/2018</a:t>
             </a:fld>
             <a:endParaRPr lang="en-US"/>
           </a:p>
@@ -1392,7 +1392,7 @@
           <a:blip r:embed="rId2" cstate="print">
             <a:extLst>
               <a:ext uri="{28A0092B-C50C-407E-A947-70E740481C1C}">
-                <a14:useLocalDpi xmlns="" xmlns:a14="http://schemas.microsoft.com/office/drawing/2010/main" val="0"/>
+                <a14:useLocalDpi xmlns:a14="http://schemas.microsoft.com/office/drawing/2010/main" xmlns="" val="0"/>
               </a:ext>
             </a:extLst>
           </a:blip>
@@ -1414,7 +1414,7 @@
           </a:ln>
           <a:extLst>
             <a:ext uri="{909E8E84-426E-40DD-AFC4-6F175D3DCCD1}">
-              <a14:hiddenFill xmlns="" xmlns:a14="http://schemas.microsoft.com/office/drawing/2010/main">
+              <a14:hiddenFill xmlns:a14="http://schemas.microsoft.com/office/drawing/2010/main" xmlns="">
                 <a:solidFill>
                   <a:srgbClr val="FFFFFF"/>
                 </a:solidFill>
@@ -1426,7 +1426,7 @@
     </p:spTree>
     <p:extLst>
       <p:ext uri="{BB962C8B-B14F-4D97-AF65-F5344CB8AC3E}">
-        <p14:creationId xmlns="" xmlns:p14="http://schemas.microsoft.com/office/powerpoint/2010/main" val="893609949"/>
+        <p14:creationId xmlns:p14="http://schemas.microsoft.com/office/powerpoint/2010/main" xmlns="" val="893609949"/>
       </p:ext>
     </p:extLst>
   </p:cSld>
@@ -1609,7 +1609,7 @@
             <a:fld id="{D5A422DA-D6F3-44FB-9B87-8B165CDF9EF8}" type="datetime1">
               <a:rPr lang="en-US" smtClean="0"/>
               <a:pPr/>
-              <a:t>9/2/2018</a:t>
+              <a:t>9/4/2018</a:t>
             </a:fld>
             <a:endParaRPr lang="en-US"/>
           </a:p>
@@ -1661,7 +1661,7 @@
     </p:spTree>
     <p:extLst>
       <p:ext uri="{BB962C8B-B14F-4D97-AF65-F5344CB8AC3E}">
-        <p14:creationId xmlns="" xmlns:p14="http://schemas.microsoft.com/office/powerpoint/2010/main" val="1664471362"/>
+        <p14:creationId xmlns:p14="http://schemas.microsoft.com/office/powerpoint/2010/main" xmlns="" val="1664471362"/>
       </p:ext>
     </p:extLst>
   </p:cSld>
@@ -1858,7 +1858,7 @@
             <a:fld id="{A46E4132-E7EB-437C-9272-133399832453}" type="datetime1">
               <a:rPr lang="en-US" smtClean="0"/>
               <a:pPr/>
-              <a:t>9/2/2018</a:t>
+              <a:t>9/4/2018</a:t>
             </a:fld>
             <a:endParaRPr lang="en-US"/>
           </a:p>
@@ -1910,7 +1910,7 @@
     </p:spTree>
     <p:extLst>
       <p:ext uri="{BB962C8B-B14F-4D97-AF65-F5344CB8AC3E}">
-        <p14:creationId xmlns="" xmlns:p14="http://schemas.microsoft.com/office/powerpoint/2010/main" val="1629391393"/>
+        <p14:creationId xmlns:p14="http://schemas.microsoft.com/office/powerpoint/2010/main" xmlns="" val="1629391393"/>
       </p:ext>
     </p:extLst>
   </p:cSld>
@@ -2106,7 +2106,7 @@
             <a:fld id="{B62D89F1-B820-4DEB-B9AA-F31DAC6B126A}" type="datetime1">
               <a:rPr lang="en-US" smtClean="0"/>
               <a:pPr/>
-              <a:t>9/2/2018</a:t>
+              <a:t>9/4/2018</a:t>
             </a:fld>
             <a:endParaRPr lang="en-US"/>
           </a:p>
@@ -2158,7 +2158,7 @@
     </p:spTree>
     <p:extLst>
       <p:ext uri="{BB962C8B-B14F-4D97-AF65-F5344CB8AC3E}">
-        <p14:creationId xmlns="" xmlns:p14="http://schemas.microsoft.com/office/powerpoint/2010/main" val="3863441575"/>
+        <p14:creationId xmlns:p14="http://schemas.microsoft.com/office/powerpoint/2010/main" xmlns="" val="3863441575"/>
       </p:ext>
     </p:extLst>
   </p:cSld>
@@ -2396,7 +2396,7 @@
             <a:fld id="{5CF063B4-E290-4B83-AE60-ADD4C1A02465}" type="datetime1">
               <a:rPr lang="en-US" smtClean="0"/>
               <a:pPr/>
-              <a:t>9/2/2018</a:t>
+              <a:t>9/4/2018</a:t>
             </a:fld>
             <a:endParaRPr lang="en-US"/>
           </a:p>
@@ -2448,7 +2448,7 @@
     </p:spTree>
     <p:extLst>
       <p:ext uri="{BB962C8B-B14F-4D97-AF65-F5344CB8AC3E}">
-        <p14:creationId xmlns="" xmlns:p14="http://schemas.microsoft.com/office/powerpoint/2010/main" val="3556791830"/>
+        <p14:creationId xmlns:p14="http://schemas.microsoft.com/office/powerpoint/2010/main" xmlns="" val="3556791830"/>
       </p:ext>
     </p:extLst>
   </p:cSld>
@@ -2886,7 +2886,7 @@
             <a:fld id="{4061BB94-B03C-40EF-8FCD-7FF9F9924DFD}" type="datetime1">
               <a:rPr lang="en-US" smtClean="0"/>
               <a:pPr/>
-              <a:t>9/2/2018</a:t>
+              <a:t>9/4/2018</a:t>
             </a:fld>
             <a:endParaRPr lang="en-US"/>
           </a:p>
@@ -2938,7 +2938,7 @@
     </p:spTree>
     <p:extLst>
       <p:ext uri="{BB962C8B-B14F-4D97-AF65-F5344CB8AC3E}">
-        <p14:creationId xmlns="" xmlns:p14="http://schemas.microsoft.com/office/powerpoint/2010/main" val="4122911988"/>
+        <p14:creationId xmlns:p14="http://schemas.microsoft.com/office/powerpoint/2010/main" xmlns="" val="4122911988"/>
       </p:ext>
     </p:extLst>
   </p:cSld>
@@ -3006,7 +3006,7 @@
             <a:fld id="{AE83CC1D-3BE7-4BA0-B783-F8413D0125A4}" type="datetime1">
               <a:rPr lang="en-US" smtClean="0"/>
               <a:pPr/>
-              <a:t>9/2/2018</a:t>
+              <a:t>9/4/2018</a:t>
             </a:fld>
             <a:endParaRPr lang="en-US"/>
           </a:p>
@@ -3058,7 +3058,7 @@
     </p:spTree>
     <p:extLst>
       <p:ext uri="{BB962C8B-B14F-4D97-AF65-F5344CB8AC3E}">
-        <p14:creationId xmlns="" xmlns:p14="http://schemas.microsoft.com/office/powerpoint/2010/main" val="3029773110"/>
+        <p14:creationId xmlns:p14="http://schemas.microsoft.com/office/powerpoint/2010/main" xmlns="" val="3029773110"/>
       </p:ext>
     </p:extLst>
   </p:cSld>
@@ -3103,7 +3103,7 @@
             <a:fld id="{9EC217FA-8434-46EE-95CD-03BD8449CBA2}" type="datetime1">
               <a:rPr lang="en-US" smtClean="0"/>
               <a:pPr/>
-              <a:t>9/2/2018</a:t>
+              <a:t>9/4/2018</a:t>
             </a:fld>
             <a:endParaRPr lang="en-US"/>
           </a:p>
@@ -3155,7 +3155,7 @@
     </p:spTree>
     <p:extLst>
       <p:ext uri="{BB962C8B-B14F-4D97-AF65-F5344CB8AC3E}">
-        <p14:creationId xmlns="" xmlns:p14="http://schemas.microsoft.com/office/powerpoint/2010/main" val="4251864075"/>
+        <p14:creationId xmlns:p14="http://schemas.microsoft.com/office/powerpoint/2010/main" xmlns="" val="4251864075"/>
       </p:ext>
     </p:extLst>
   </p:cSld>
@@ -3382,7 +3382,7 @@
             <a:fld id="{EE259938-7F5E-41BF-A598-31F3BBC3FD79}" type="datetime1">
               <a:rPr lang="en-US" smtClean="0"/>
               <a:pPr/>
-              <a:t>9/2/2018</a:t>
+              <a:t>9/4/2018</a:t>
             </a:fld>
             <a:endParaRPr lang="en-US"/>
           </a:p>
@@ -3434,7 +3434,7 @@
     </p:spTree>
     <p:extLst>
       <p:ext uri="{BB962C8B-B14F-4D97-AF65-F5344CB8AC3E}">
-        <p14:creationId xmlns="" xmlns:p14="http://schemas.microsoft.com/office/powerpoint/2010/main" val="3174452648"/>
+        <p14:creationId xmlns:p14="http://schemas.microsoft.com/office/powerpoint/2010/main" xmlns="" val="3174452648"/>
       </p:ext>
     </p:extLst>
   </p:cSld>
@@ -3606,7 +3606,7 @@
             <a:fld id="{DE3D4D2C-E964-4817-9312-DF6DAA14821B}" type="datetime1">
               <a:rPr lang="en-US" smtClean="0"/>
               <a:pPr/>
-              <a:t>9/2/2018</a:t>
+              <a:t>9/4/2018</a:t>
             </a:fld>
             <a:endParaRPr lang="en-US"/>
           </a:p>
@@ -3694,7 +3694,7 @@
     </p:spTree>
     <p:extLst>
       <p:ext uri="{BB962C8B-B14F-4D97-AF65-F5344CB8AC3E}">
-        <p14:creationId xmlns="" xmlns:p14="http://schemas.microsoft.com/office/powerpoint/2010/main" val="1944039382"/>
+        <p14:creationId xmlns:p14="http://schemas.microsoft.com/office/powerpoint/2010/main" xmlns="" val="1944039382"/>
       </p:ext>
     </p:extLst>
   </p:cSld>
@@ -4074,7 +4074,7 @@
     </p:spTree>
     <p:extLst>
       <p:ext uri="{BB962C8B-B14F-4D97-AF65-F5344CB8AC3E}">
-        <p14:creationId xmlns="" xmlns:p14="http://schemas.microsoft.com/office/powerpoint/2010/main" val="363920370"/>
+        <p14:creationId xmlns:p14="http://schemas.microsoft.com/office/powerpoint/2010/main" xmlns="" val="363920370"/>
       </p:ext>
     </p:extLst>
   </p:cSld>
@@ -4400,7 +4400,7 @@
     </p:spTree>
     <p:extLst>
       <p:ext uri="{BB962C8B-B14F-4D97-AF65-F5344CB8AC3E}">
-        <p14:creationId xmlns="" xmlns:p14="http://schemas.microsoft.com/office/powerpoint/2010/main" val="606838647"/>
+        <p14:creationId xmlns:p14="http://schemas.microsoft.com/office/powerpoint/2010/main" xmlns="" val="606838647"/>
       </p:ext>
     </p:extLst>
   </p:cSld>
@@ -4495,28 +4495,22 @@
       </p:sp>
       <p:pic>
         <p:nvPicPr>
-          <p:cNvPr id="5" name="Picture 4"/>
+          <p:cNvPr id="6" name="Picture 5" descr="pp.PNG"/>
           <p:cNvPicPr>
             <a:picLocks noChangeAspect="1"/>
           </p:cNvPicPr>
           <p:nvPr/>
         </p:nvPicPr>
         <p:blipFill>
-          <a:blip r:embed="rId2" cstate="print">
-            <a:extLst>
-              <a:ext uri="{28A0092B-C50C-407E-A947-70E740481C1C}">
-                <a14:useLocalDpi xmlns="" xmlns:a14="http://schemas.microsoft.com/office/drawing/2010/main" val="0"/>
-              </a:ext>
-            </a:extLst>
-          </a:blip>
+          <a:blip r:embed="rId2" cstate="print"/>
           <a:stretch>
             <a:fillRect/>
           </a:stretch>
         </p:blipFill>
         <p:spPr>
           <a:xfrm>
-            <a:off x="1517900" y="739290"/>
-            <a:ext cx="6108200" cy="3970330"/>
+            <a:off x="1334424" y="891994"/>
+            <a:ext cx="6138971" cy="3664921"/>
           </a:xfrm>
           <a:prstGeom prst="rect">
             <a:avLst/>
@@ -4526,7 +4520,7 @@
     </p:spTree>
     <p:extLst>
       <p:ext uri="{BB962C8B-B14F-4D97-AF65-F5344CB8AC3E}">
-        <p14:creationId xmlns="" xmlns:p14="http://schemas.microsoft.com/office/powerpoint/2010/main" val="3663034223"/>
+        <p14:creationId xmlns:p14="http://schemas.microsoft.com/office/powerpoint/2010/main" xmlns="" val="3663034223"/>
       </p:ext>
     </p:extLst>
   </p:cSld>
@@ -4636,7 +4630,7 @@
           <a:blip r:embed="rId2" cstate="print">
             <a:extLst>
               <a:ext uri="{28A0092B-C50C-407E-A947-70E740481C1C}">
-                <a14:useLocalDpi xmlns="" xmlns:a14="http://schemas.microsoft.com/office/drawing/2010/main" val="0"/>
+                <a14:useLocalDpi xmlns:a14="http://schemas.microsoft.com/office/drawing/2010/main" xmlns="" val="0"/>
               </a:ext>
             </a:extLst>
           </a:blip>
@@ -4657,7 +4651,7 @@
     </p:spTree>
     <p:extLst>
       <p:ext uri="{BB962C8B-B14F-4D97-AF65-F5344CB8AC3E}">
-        <p14:creationId xmlns="" xmlns:p14="http://schemas.microsoft.com/office/powerpoint/2010/main" val="3100631720"/>
+        <p14:creationId xmlns:p14="http://schemas.microsoft.com/office/powerpoint/2010/main" xmlns="" val="3100631720"/>
       </p:ext>
     </p:extLst>
   </p:cSld>
@@ -4835,7 +4829,7 @@
           <a:blip r:embed="rId2" cstate="print">
             <a:extLst>
               <a:ext uri="{28A0092B-C50C-407E-A947-70E740481C1C}">
-                <a14:useLocalDpi xmlns="" xmlns:a14="http://schemas.microsoft.com/office/drawing/2010/main" val="0"/>
+                <a14:useLocalDpi xmlns:a14="http://schemas.microsoft.com/office/drawing/2010/main" xmlns="" val="0"/>
               </a:ext>
             </a:extLst>
           </a:blip>
@@ -4884,7 +4878,7 @@
     </p:spTree>
     <p:extLst>
       <p:ext uri="{BB962C8B-B14F-4D97-AF65-F5344CB8AC3E}">
-        <p14:creationId xmlns="" xmlns:p14="http://schemas.microsoft.com/office/powerpoint/2010/main" val="311239273"/>
+        <p14:creationId xmlns:p14="http://schemas.microsoft.com/office/powerpoint/2010/main" xmlns="" val="311239273"/>
       </p:ext>
     </p:extLst>
   </p:cSld>
@@ -4989,7 +4983,7 @@
           <a:blip r:embed="rId2" cstate="print">
             <a:extLst>
               <a:ext uri="{28A0092B-C50C-407E-A947-70E740481C1C}">
-                <a14:useLocalDpi xmlns="" xmlns:a14="http://schemas.microsoft.com/office/drawing/2010/main" val="0"/>
+                <a14:useLocalDpi xmlns:a14="http://schemas.microsoft.com/office/drawing/2010/main" xmlns="" val="0"/>
               </a:ext>
             </a:extLst>
           </a:blip>
@@ -5010,7 +5004,7 @@
     </p:spTree>
     <p:extLst>
       <p:ext uri="{BB962C8B-B14F-4D97-AF65-F5344CB8AC3E}">
-        <p14:creationId xmlns="" xmlns:p14="http://schemas.microsoft.com/office/powerpoint/2010/main" val="354573049"/>
+        <p14:creationId xmlns:p14="http://schemas.microsoft.com/office/powerpoint/2010/main" xmlns="" val="354573049"/>
       </p:ext>
     </p:extLst>
   </p:cSld>
@@ -5299,7 +5293,7 @@
     </p:spTree>
     <p:extLst>
       <p:ext uri="{BB962C8B-B14F-4D97-AF65-F5344CB8AC3E}">
-        <p14:creationId xmlns="" xmlns:p14="http://schemas.microsoft.com/office/powerpoint/2010/main" val="2864219965"/>
+        <p14:creationId xmlns:p14="http://schemas.microsoft.com/office/powerpoint/2010/main" xmlns="" val="2864219965"/>
       </p:ext>
     </p:extLst>
   </p:cSld>
@@ -5393,7 +5387,7 @@
     </p:spTree>
     <p:extLst>
       <p:ext uri="{BB962C8B-B14F-4D97-AF65-F5344CB8AC3E}">
-        <p14:creationId xmlns="" xmlns:p14="http://schemas.microsoft.com/office/powerpoint/2010/main" val="1757882893"/>
+        <p14:creationId xmlns:p14="http://schemas.microsoft.com/office/powerpoint/2010/main" xmlns="" val="1757882893"/>
       </p:ext>
     </p:extLst>
   </p:cSld>
@@ -5907,7 +5901,7 @@
     </p:spTree>
     <p:extLst>
       <p:ext uri="{BB962C8B-B14F-4D97-AF65-F5344CB8AC3E}">
-        <p14:creationId xmlns="" xmlns:p14="http://schemas.microsoft.com/office/powerpoint/2010/main" val="4103309497"/>
+        <p14:creationId xmlns:p14="http://schemas.microsoft.com/office/powerpoint/2010/main" xmlns="" val="4103309497"/>
       </p:ext>
     </p:extLst>
   </p:cSld>
@@ -6250,7 +6244,7 @@
     </p:spTree>
     <p:extLst>
       <p:ext uri="{BB962C8B-B14F-4D97-AF65-F5344CB8AC3E}">
-        <p14:creationId xmlns="" xmlns:p14="http://schemas.microsoft.com/office/powerpoint/2010/main" val="1101633878"/>
+        <p14:creationId xmlns:p14="http://schemas.microsoft.com/office/powerpoint/2010/main" xmlns="" val="1101633878"/>
       </p:ext>
     </p:extLst>
   </p:cSld>
@@ -6651,7 +6645,7 @@
     </p:spTree>
     <p:extLst>
       <p:ext uri="{BB962C8B-B14F-4D97-AF65-F5344CB8AC3E}">
-        <p14:creationId xmlns="" xmlns:p14="http://schemas.microsoft.com/office/powerpoint/2010/main" val="250242969"/>
+        <p14:creationId xmlns:p14="http://schemas.microsoft.com/office/powerpoint/2010/main" xmlns="" val="250242969"/>
       </p:ext>
     </p:extLst>
   </p:cSld>
@@ -6923,7 +6917,7 @@
     </p:spTree>
     <p:extLst>
       <p:ext uri="{BB962C8B-B14F-4D97-AF65-F5344CB8AC3E}">
-        <p14:creationId xmlns="" xmlns:p14="http://schemas.microsoft.com/office/powerpoint/2010/main" val="3264180485"/>
+        <p14:creationId xmlns:p14="http://schemas.microsoft.com/office/powerpoint/2010/main" xmlns="" val="3264180485"/>
       </p:ext>
     </p:extLst>
   </p:cSld>
@@ -7208,7 +7202,7 @@
     </p:spTree>
     <p:extLst>
       <p:ext uri="{BB962C8B-B14F-4D97-AF65-F5344CB8AC3E}">
-        <p14:creationId xmlns="" xmlns:p14="http://schemas.microsoft.com/office/powerpoint/2010/main" val="1648665598"/>
+        <p14:creationId xmlns:p14="http://schemas.microsoft.com/office/powerpoint/2010/main" xmlns="" val="1648665598"/>
       </p:ext>
     </p:extLst>
   </p:cSld>
@@ -7475,7 +7469,7 @@
     </p:spTree>
     <p:extLst>
       <p:ext uri="{BB962C8B-B14F-4D97-AF65-F5344CB8AC3E}">
-        <p14:creationId xmlns="" xmlns:p14="http://schemas.microsoft.com/office/powerpoint/2010/main" val="1307079794"/>
+        <p14:creationId xmlns:p14="http://schemas.microsoft.com/office/powerpoint/2010/main" xmlns="" val="1307079794"/>
       </p:ext>
     </p:extLst>
   </p:cSld>
@@ -7680,7 +7674,7 @@
     </p:spTree>
     <p:extLst>
       <p:ext uri="{BB962C8B-B14F-4D97-AF65-F5344CB8AC3E}">
-        <p14:creationId xmlns="" xmlns:p14="http://schemas.microsoft.com/office/powerpoint/2010/main" val="2125120349"/>
+        <p14:creationId xmlns:p14="http://schemas.microsoft.com/office/powerpoint/2010/main" xmlns="" val="2125120349"/>
       </p:ext>
     </p:extLst>
   </p:cSld>
@@ -7953,7 +7947,7 @@
     </p:spTree>
     <p:extLst>
       <p:ext uri="{BB962C8B-B14F-4D97-AF65-F5344CB8AC3E}">
-        <p14:creationId xmlns="" xmlns:p14="http://schemas.microsoft.com/office/powerpoint/2010/main" val="4009980914"/>
+        <p14:creationId xmlns:p14="http://schemas.microsoft.com/office/powerpoint/2010/main" xmlns="" val="4009980914"/>
       </p:ext>
     </p:extLst>
   </p:cSld>

</xml_diff>